<commit_message>
Color of background changed
</commit_message>
<xml_diff>
--- a/DevOps_Q4_KY_Mykhailo Kuznietsov.pptx
+++ b/DevOps_Q4_KY_Mykhailo Kuznietsov.pptx
@@ -199,7 +199,7 @@
           <a:p>
             <a:fld id="{6B3EE531-56BB-4549-BAFD-30DAD70DDF42}" type="datetimeFigureOut">
               <a:rPr lang="ru-RU" smtClean="0"/>
-              <a:t>15.02.2022</a:t>
+              <a:t>16.02.2022</a:t>
             </a:fld>
             <a:endParaRPr lang="ru-RU"/>
           </a:p>
@@ -900,7 +900,7 @@
           <a:p>
             <a:fld id="{1168AFA9-89AC-4D41-BCEC-434A32288899}" type="datetimeFigureOut">
               <a:rPr lang="ru-RU" smtClean="0"/>
-              <a:t>15.02.2022</a:t>
+              <a:t>16.02.2022</a:t>
             </a:fld>
             <a:endParaRPr lang="ru-RU"/>
           </a:p>
@@ -1070,7 +1070,7 @@
           <a:p>
             <a:fld id="{1168AFA9-89AC-4D41-BCEC-434A32288899}" type="datetimeFigureOut">
               <a:rPr lang="ru-RU" smtClean="0"/>
-              <a:t>15.02.2022</a:t>
+              <a:t>16.02.2022</a:t>
             </a:fld>
             <a:endParaRPr lang="ru-RU"/>
           </a:p>
@@ -1250,7 +1250,7 @@
           <a:p>
             <a:fld id="{1168AFA9-89AC-4D41-BCEC-434A32288899}" type="datetimeFigureOut">
               <a:rPr lang="ru-RU" smtClean="0"/>
-              <a:t>15.02.2022</a:t>
+              <a:t>16.02.2022</a:t>
             </a:fld>
             <a:endParaRPr lang="ru-RU"/>
           </a:p>
@@ -1420,7 +1420,7 @@
           <a:p>
             <a:fld id="{1168AFA9-89AC-4D41-BCEC-434A32288899}" type="datetimeFigureOut">
               <a:rPr lang="ru-RU" smtClean="0"/>
-              <a:t>15.02.2022</a:t>
+              <a:t>16.02.2022</a:t>
             </a:fld>
             <a:endParaRPr lang="ru-RU"/>
           </a:p>
@@ -1666,7 +1666,7 @@
           <a:p>
             <a:fld id="{1168AFA9-89AC-4D41-BCEC-434A32288899}" type="datetimeFigureOut">
               <a:rPr lang="ru-RU" smtClean="0"/>
-              <a:t>15.02.2022</a:t>
+              <a:t>16.02.2022</a:t>
             </a:fld>
             <a:endParaRPr lang="ru-RU"/>
           </a:p>
@@ -1954,7 +1954,7 @@
           <a:p>
             <a:fld id="{1168AFA9-89AC-4D41-BCEC-434A32288899}" type="datetimeFigureOut">
               <a:rPr lang="ru-RU" smtClean="0"/>
-              <a:t>15.02.2022</a:t>
+              <a:t>16.02.2022</a:t>
             </a:fld>
             <a:endParaRPr lang="ru-RU"/>
           </a:p>
@@ -2376,7 +2376,7 @@
           <a:p>
             <a:fld id="{1168AFA9-89AC-4D41-BCEC-434A32288899}" type="datetimeFigureOut">
               <a:rPr lang="ru-RU" smtClean="0"/>
-              <a:t>15.02.2022</a:t>
+              <a:t>16.02.2022</a:t>
             </a:fld>
             <a:endParaRPr lang="ru-RU"/>
           </a:p>
@@ -2494,7 +2494,7 @@
           <a:p>
             <a:fld id="{1168AFA9-89AC-4D41-BCEC-434A32288899}" type="datetimeFigureOut">
               <a:rPr lang="ru-RU" smtClean="0"/>
-              <a:t>15.02.2022</a:t>
+              <a:t>16.02.2022</a:t>
             </a:fld>
             <a:endParaRPr lang="ru-RU"/>
           </a:p>
@@ -2589,7 +2589,7 @@
           <a:p>
             <a:fld id="{1168AFA9-89AC-4D41-BCEC-434A32288899}" type="datetimeFigureOut">
               <a:rPr lang="ru-RU" smtClean="0"/>
-              <a:t>15.02.2022</a:t>
+              <a:t>16.02.2022</a:t>
             </a:fld>
             <a:endParaRPr lang="ru-RU"/>
           </a:p>
@@ -2866,7 +2866,7 @@
           <a:p>
             <a:fld id="{1168AFA9-89AC-4D41-BCEC-434A32288899}" type="datetimeFigureOut">
               <a:rPr lang="ru-RU" smtClean="0"/>
-              <a:t>15.02.2022</a:t>
+              <a:t>16.02.2022</a:t>
             </a:fld>
             <a:endParaRPr lang="ru-RU"/>
           </a:p>
@@ -3119,7 +3119,7 @@
           <a:p>
             <a:fld id="{1168AFA9-89AC-4D41-BCEC-434A32288899}" type="datetimeFigureOut">
               <a:rPr lang="ru-RU" smtClean="0"/>
-              <a:t>15.02.2022</a:t>
+              <a:t>16.02.2022</a:t>
             </a:fld>
             <a:endParaRPr lang="ru-RU"/>
           </a:p>
@@ -3332,7 +3332,7 @@
           <a:p>
             <a:fld id="{1168AFA9-89AC-4D41-BCEC-434A32288899}" type="datetimeFigureOut">
               <a:rPr lang="ru-RU" smtClean="0"/>
-              <a:t>15.02.2022</a:t>
+              <a:t>16.02.2022</a:t>
             </a:fld>
             <a:endParaRPr lang="ru-RU"/>
           </a:p>
@@ -4583,7 +4583,7 @@
         </p:blipFill>
         <p:spPr bwMode="auto">
           <a:xfrm>
-            <a:off x="-324544" y="3573016"/>
+            <a:off x="755576" y="1484784"/>
             <a:ext cx="8055526" cy="4531234"/>
           </a:xfrm>
           <a:prstGeom prst="rect">

</xml_diff>